<commit_message>
20210803_0148 add jq ajax
</commit_message>
<xml_diff>
--- a/動態網頁.pptx
+++ b/動態網頁.pptx
@@ -23,6 +23,7 @@
     <p:sldId id="271" r:id="rId17"/>
     <p:sldId id="272" r:id="rId18"/>
     <p:sldId id="273" r:id="rId19"/>
+    <p:sldId id="274" r:id="rId20"/>
   </p:sldIdLst>
   <p:sldSz cx="9144000" cy="6858000" type="screen4x3"/>
   <p:notesSz cx="6858000" cy="9144000"/>
@@ -123,7 +124,7 @@
   </p:defaultTextStyle>
   <p:extLst>
     <p:ext uri="{EFAFB233-063F-42B5-8137-9DF3F51BA10A}">
-      <p15:sldGuideLst xmlns:p15="http://schemas.microsoft.com/office/powerpoint/2012/main">
+      <p15:sldGuideLst xmlns:p15="http://schemas.microsoft.com/office/powerpoint/2012/main" xmlns="">
         <p15:guide id="1" orient="horz" pos="2160">
           <p15:clr>
             <a:srgbClr val="A4A3A4"/>
@@ -319,7 +320,7 @@
           <a:p>
             <a:fld id="{5BBEAD13-0566-4C6C-97E7-55F17F24B09F}" type="datetimeFigureOut">
               <a:rPr lang="zh-TW" altLang="en-US" smtClean="0"/>
-              <a:t>2021/7/29</a:t>
+              <a:t>2021/8/2</a:t>
             </a:fld>
             <a:endParaRPr lang="zh-TW" altLang="en-US"/>
           </a:p>
@@ -482,7 +483,7 @@
           <a:p>
             <a:fld id="{5BBEAD13-0566-4C6C-97E7-55F17F24B09F}" type="datetimeFigureOut">
               <a:rPr lang="zh-TW" altLang="en-US" smtClean="0"/>
-              <a:t>2021/7/29</a:t>
+              <a:t>2021/8/2</a:t>
             </a:fld>
             <a:endParaRPr lang="zh-TW" altLang="en-US"/>
           </a:p>
@@ -655,7 +656,7 @@
           <a:p>
             <a:fld id="{5BBEAD13-0566-4C6C-97E7-55F17F24B09F}" type="datetimeFigureOut">
               <a:rPr lang="zh-TW" altLang="en-US" smtClean="0"/>
-              <a:t>2021/7/29</a:t>
+              <a:t>2021/8/2</a:t>
             </a:fld>
             <a:endParaRPr lang="zh-TW" altLang="en-US"/>
           </a:p>
@@ -818,7 +819,7 @@
           <a:p>
             <a:fld id="{5BBEAD13-0566-4C6C-97E7-55F17F24B09F}" type="datetimeFigureOut">
               <a:rPr lang="zh-TW" altLang="en-US" smtClean="0"/>
-              <a:t>2021/7/29</a:t>
+              <a:t>2021/8/2</a:t>
             </a:fld>
             <a:endParaRPr lang="zh-TW" altLang="en-US"/>
           </a:p>
@@ -1058,7 +1059,7 @@
           <a:p>
             <a:fld id="{5BBEAD13-0566-4C6C-97E7-55F17F24B09F}" type="datetimeFigureOut">
               <a:rPr lang="zh-TW" altLang="en-US" smtClean="0"/>
-              <a:t>2021/7/29</a:t>
+              <a:t>2021/8/2</a:t>
             </a:fld>
             <a:endParaRPr lang="zh-TW" altLang="en-US"/>
           </a:p>
@@ -1338,7 +1339,7 @@
           <a:p>
             <a:fld id="{5BBEAD13-0566-4C6C-97E7-55F17F24B09F}" type="datetimeFigureOut">
               <a:rPr lang="zh-TW" altLang="en-US" smtClean="0"/>
-              <a:t>2021/7/29</a:t>
+              <a:t>2021/8/2</a:t>
             </a:fld>
             <a:endParaRPr lang="zh-TW" altLang="en-US"/>
           </a:p>
@@ -1752,7 +1753,7 @@
           <a:p>
             <a:fld id="{5BBEAD13-0566-4C6C-97E7-55F17F24B09F}" type="datetimeFigureOut">
               <a:rPr lang="zh-TW" altLang="en-US" smtClean="0"/>
-              <a:t>2021/7/29</a:t>
+              <a:t>2021/8/2</a:t>
             </a:fld>
             <a:endParaRPr lang="zh-TW" altLang="en-US"/>
           </a:p>
@@ -1864,7 +1865,7 @@
           <a:p>
             <a:fld id="{5BBEAD13-0566-4C6C-97E7-55F17F24B09F}" type="datetimeFigureOut">
               <a:rPr lang="zh-TW" altLang="en-US" smtClean="0"/>
-              <a:t>2021/7/29</a:t>
+              <a:t>2021/8/2</a:t>
             </a:fld>
             <a:endParaRPr lang="zh-TW" altLang="en-US"/>
           </a:p>
@@ -1954,7 +1955,7 @@
           <a:p>
             <a:fld id="{5BBEAD13-0566-4C6C-97E7-55F17F24B09F}" type="datetimeFigureOut">
               <a:rPr lang="zh-TW" altLang="en-US" smtClean="0"/>
-              <a:t>2021/7/29</a:t>
+              <a:t>2021/8/2</a:t>
             </a:fld>
             <a:endParaRPr lang="zh-TW" altLang="en-US"/>
           </a:p>
@@ -2224,7 +2225,7 @@
           <a:p>
             <a:fld id="{5BBEAD13-0566-4C6C-97E7-55F17F24B09F}" type="datetimeFigureOut">
               <a:rPr lang="zh-TW" altLang="en-US" smtClean="0"/>
-              <a:t>2021/7/29</a:t>
+              <a:t>2021/8/2</a:t>
             </a:fld>
             <a:endParaRPr lang="zh-TW" altLang="en-US"/>
           </a:p>
@@ -2471,7 +2472,7 @@
           <a:p>
             <a:fld id="{5BBEAD13-0566-4C6C-97E7-55F17F24B09F}" type="datetimeFigureOut">
               <a:rPr lang="zh-TW" altLang="en-US" smtClean="0"/>
-              <a:t>2021/7/29</a:t>
+              <a:t>2021/8/2</a:t>
             </a:fld>
             <a:endParaRPr lang="zh-TW" altLang="en-US"/>
           </a:p>
@@ -2677,7 +2678,7 @@
           <a:p>
             <a:fld id="{5BBEAD13-0566-4C6C-97E7-55F17F24B09F}" type="datetimeFigureOut">
               <a:rPr lang="zh-TW" altLang="en-US" smtClean="0"/>
-              <a:t>2021/7/29</a:t>
+              <a:t>2021/8/2</a:t>
             </a:fld>
             <a:endParaRPr lang="zh-TW" altLang="en-US"/>
           </a:p>
@@ -6408,7 +6409,55 @@
                 <a:latin typeface="Times New Roman" pitchFamily="18" charset="0"/>
                 <a:cs typeface="Times New Roman" pitchFamily="18" charset="0"/>
               </a:rPr>
-              <a:t>以下用 </a:t>
+              <a:t>最</a:t>
+            </a:r>
+            <a:r>
+              <a:rPr lang="zh-TW" altLang="en-US" sz="2000" dirty="0" smtClean="0">
+                <a:latin typeface="Times New Roman" pitchFamily="18" charset="0"/>
+                <a:cs typeface="Times New Roman" pitchFamily="18" charset="0"/>
+              </a:rPr>
+              <a:t>常見的方法是 </a:t>
+            </a:r>
+            <a:r>
+              <a:rPr lang="en-US" altLang="zh-TW" sz="2000" dirty="0" smtClean="0">
+                <a:latin typeface="Times New Roman" pitchFamily="18" charset="0"/>
+                <a:cs typeface="Times New Roman" pitchFamily="18" charset="0"/>
+              </a:rPr>
+              <a:t>GET</a:t>
+            </a:r>
+            <a:r>
+              <a:rPr lang="zh-TW" altLang="en-US" sz="2000" dirty="0" smtClean="0">
+                <a:latin typeface="Times New Roman" pitchFamily="18" charset="0"/>
+                <a:cs typeface="Times New Roman" pitchFamily="18" charset="0"/>
+              </a:rPr>
+              <a:t> 和 </a:t>
+            </a:r>
+            <a:r>
+              <a:rPr lang="en-US" altLang="zh-TW" sz="2000" dirty="0" smtClean="0">
+                <a:latin typeface="Times New Roman" pitchFamily="18" charset="0"/>
+                <a:cs typeface="Times New Roman" pitchFamily="18" charset="0"/>
+              </a:rPr>
+              <a:t>POST</a:t>
+            </a:r>
+            <a:endParaRPr lang="en-US" altLang="zh-TW" sz="2000" dirty="0" smtClean="0">
+              <a:latin typeface="Times New Roman" pitchFamily="18" charset="0"/>
+              <a:cs typeface="Times New Roman" pitchFamily="18" charset="0"/>
+            </a:endParaRPr>
+          </a:p>
+          <a:p>
+            <a:r>
+              <a:rPr lang="zh-TW" altLang="en-US" sz="2000" dirty="0" smtClean="0">
+                <a:latin typeface="Times New Roman" pitchFamily="18" charset="0"/>
+                <a:cs typeface="Times New Roman" pitchFamily="18" charset="0"/>
+              </a:rPr>
+              <a:t>以下</a:t>
+            </a:r>
+            <a:r>
+              <a:rPr lang="zh-TW" altLang="en-US" sz="2000" dirty="0">
+                <a:latin typeface="Times New Roman" pitchFamily="18" charset="0"/>
+                <a:cs typeface="Times New Roman" pitchFamily="18" charset="0"/>
+              </a:rPr>
+              <a:t>用 </a:t>
             </a:r>
             <a:r>
               <a:rPr lang="en-US" altLang="zh-TW" sz="2000" dirty="0">
@@ -6983,7 +7032,7 @@
           <p:cNvPr id="3" name="圖片 2">
             <a:extLst>
               <a:ext uri="{FF2B5EF4-FFF2-40B4-BE49-F238E27FC236}">
-                <a16:creationId xmlns:a16="http://schemas.microsoft.com/office/drawing/2014/main" id="{09A6E7AA-689E-4A7A-AB61-91185B9D6D65}"/>
+                <a16:creationId xmlns:a16="http://schemas.microsoft.com/office/drawing/2014/main" xmlns="" id="{09A6E7AA-689E-4A7A-AB61-91185B9D6D65}"/>
               </a:ext>
             </a:extLst>
           </p:cNvPr>
@@ -7176,7 +7225,7 @@
           <p:cNvPr id="7" name="圖片 6" descr="一張含有 文字 的圖片&#10;&#10;自動產生的描述">
             <a:extLst>
               <a:ext uri="{FF2B5EF4-FFF2-40B4-BE49-F238E27FC236}">
-                <a16:creationId xmlns:a16="http://schemas.microsoft.com/office/drawing/2014/main" id="{4870EBFC-DE4A-40E9-9FC9-CD9672B6988E}"/>
+                <a16:creationId xmlns:a16="http://schemas.microsoft.com/office/drawing/2014/main" xmlns="" id="{4870EBFC-DE4A-40E9-9FC9-CD9672B6988E}"/>
               </a:ext>
             </a:extLst>
           </p:cNvPr>
@@ -7211,7 +7260,7 @@
           <p:cNvPr id="8" name="矩形 7">
             <a:extLst>
               <a:ext uri="{FF2B5EF4-FFF2-40B4-BE49-F238E27FC236}">
-                <a16:creationId xmlns:a16="http://schemas.microsoft.com/office/drawing/2014/main" id="{C635761B-2CAD-476F-ACE0-1B793B254F5D}"/>
+                <a16:creationId xmlns:a16="http://schemas.microsoft.com/office/drawing/2014/main" xmlns="" id="{C635761B-2CAD-476F-ACE0-1B793B254F5D}"/>
               </a:ext>
             </a:extLst>
           </p:cNvPr>
@@ -7263,7 +7312,7 @@
           <p:cNvPr id="9" name="文字方塊 8">
             <a:extLst>
               <a:ext uri="{FF2B5EF4-FFF2-40B4-BE49-F238E27FC236}">
-                <a16:creationId xmlns:a16="http://schemas.microsoft.com/office/drawing/2014/main" id="{B2506B1C-745E-4CDA-926C-2CFCF564319B}"/>
+                <a16:creationId xmlns:a16="http://schemas.microsoft.com/office/drawing/2014/main" xmlns="" id="{B2506B1C-745E-4CDA-926C-2CFCF564319B}"/>
               </a:ext>
             </a:extLst>
           </p:cNvPr>
@@ -7344,7 +7393,7 @@
           <p:cNvPr id="11" name="圖片 10" descr="一張含有 文字 的圖片&#10;&#10;自動產生的描述">
             <a:extLst>
               <a:ext uri="{FF2B5EF4-FFF2-40B4-BE49-F238E27FC236}">
-                <a16:creationId xmlns:a16="http://schemas.microsoft.com/office/drawing/2014/main" id="{E1596373-13C3-4632-A41E-A767288C6828}"/>
+                <a16:creationId xmlns:a16="http://schemas.microsoft.com/office/drawing/2014/main" xmlns="" id="{E1596373-13C3-4632-A41E-A767288C6828}"/>
               </a:ext>
             </a:extLst>
           </p:cNvPr>
@@ -7814,6 +7863,626 @@
     <p:extLst>
       <p:ext uri="{BB962C8B-B14F-4D97-AF65-F5344CB8AC3E}">
         <p14:creationId xmlns:p14="http://schemas.microsoft.com/office/powerpoint/2010/main" val="3846988205"/>
+      </p:ext>
+    </p:extLst>
+  </p:cSld>
+  <p:clrMapOvr>
+    <a:masterClrMapping/>
+  </p:clrMapOvr>
+</p:sld>
+</file>
+
+<file path=ppt/slides/slide19.xml><?xml version="1.0" encoding="utf-8"?>
+<p:sld xmlns:a="http://schemas.openxmlformats.org/drawingml/2006/main" xmlns:r="http://schemas.openxmlformats.org/officeDocument/2006/relationships" xmlns:p="http://schemas.openxmlformats.org/presentationml/2006/main">
+  <p:cSld>
+    <p:spTree>
+      <p:nvGrpSpPr>
+        <p:cNvPr id="1" name=""/>
+        <p:cNvGrpSpPr/>
+        <p:nvPr/>
+      </p:nvGrpSpPr>
+      <p:grpSpPr>
+        <a:xfrm>
+          <a:off x="0" y="0"/>
+          <a:ext cx="0" cy="0"/>
+          <a:chOff x="0" y="0"/>
+          <a:chExt cx="0" cy="0"/>
+        </a:xfrm>
+      </p:grpSpPr>
+      <p:sp>
+        <p:nvSpPr>
+          <p:cNvPr id="4" name="文字方塊 3"/>
+          <p:cNvSpPr txBox="1"/>
+          <p:nvPr/>
+        </p:nvSpPr>
+        <p:spPr>
+          <a:xfrm>
+            <a:off x="0" y="0"/>
+            <a:ext cx="9144000" cy="836712"/>
+          </a:xfrm>
+          <a:prstGeom prst="rect">
+            <a:avLst/>
+          </a:prstGeom>
+          <a:noFill/>
+        </p:spPr>
+        <p:txBody>
+          <a:bodyPr wrap="square" rtlCol="0" anchor="ctr">
+            <a:noAutofit/>
+          </a:bodyPr>
+          <a:lstStyle/>
+          <a:p>
+            <a:pPr algn="ctr"/>
+            <a:r>
+              <a:rPr lang="en-US" altLang="zh-TW" sz="2400" dirty="0">
+                <a:latin typeface="Times New Roman" pitchFamily="18" charset="0"/>
+                <a:cs typeface="Times New Roman" pitchFamily="18" charset="0"/>
+              </a:rPr>
+              <a:t>jQuery</a:t>
+            </a:r>
+            <a:endParaRPr lang="zh-TW" altLang="en-US" sz="2400" dirty="0">
+              <a:latin typeface="Times New Roman" pitchFamily="18" charset="0"/>
+              <a:cs typeface="Times New Roman" pitchFamily="18" charset="0"/>
+            </a:endParaRPr>
+          </a:p>
+        </p:txBody>
+      </p:sp>
+      <p:sp>
+        <p:nvSpPr>
+          <p:cNvPr id="5" name="文字方塊 4"/>
+          <p:cNvSpPr txBox="1"/>
+          <p:nvPr/>
+        </p:nvSpPr>
+        <p:spPr>
+          <a:xfrm>
+            <a:off x="8711952" y="6573902"/>
+            <a:ext cx="432048" cy="276999"/>
+          </a:xfrm>
+          <a:prstGeom prst="rect">
+            <a:avLst/>
+          </a:prstGeom>
+          <a:noFill/>
+        </p:spPr>
+        <p:txBody>
+          <a:bodyPr wrap="square" rtlCol="0" anchor="ctr">
+            <a:spAutoFit/>
+          </a:bodyPr>
+          <a:lstStyle/>
+          <a:p>
+            <a:pPr algn="ctr"/>
+            <a:r>
+              <a:rPr lang="en-US" altLang="zh-TW" sz="1200" dirty="0" smtClean="0">
+                <a:latin typeface="Times New Roman" pitchFamily="18" charset="0"/>
+                <a:cs typeface="Times New Roman" pitchFamily="18" charset="0"/>
+              </a:rPr>
+              <a:t>19</a:t>
+            </a:r>
+            <a:endParaRPr lang="zh-TW" altLang="en-US" sz="1200" dirty="0">
+              <a:latin typeface="Times New Roman" pitchFamily="18" charset="0"/>
+              <a:cs typeface="Times New Roman" pitchFamily="18" charset="0"/>
+            </a:endParaRPr>
+          </a:p>
+        </p:txBody>
+      </p:sp>
+      <p:sp>
+        <p:nvSpPr>
+          <p:cNvPr id="6" name="文字方塊 5"/>
+          <p:cNvSpPr txBox="1"/>
+          <p:nvPr/>
+        </p:nvSpPr>
+        <p:spPr>
+          <a:xfrm>
+            <a:off x="503548" y="1124744"/>
+            <a:ext cx="8136904" cy="5328592"/>
+          </a:xfrm>
+          <a:prstGeom prst="rect">
+            <a:avLst/>
+          </a:prstGeom>
+          <a:noFill/>
+        </p:spPr>
+        <p:txBody>
+          <a:bodyPr wrap="square" rtlCol="0" anchor="t">
+            <a:noAutofit/>
+          </a:bodyPr>
+          <a:lstStyle/>
+          <a:p>
+            <a:r>
+              <a:rPr lang="zh-TW" altLang="en-US" sz="2000" dirty="0">
+                <a:latin typeface="Times New Roman" pitchFamily="18" charset="0"/>
+                <a:cs typeface="Times New Roman" pitchFamily="18" charset="0"/>
+              </a:rPr>
+              <a:t>語法：</a:t>
+            </a:r>
+            <a:endParaRPr lang="en-US" altLang="zh-TW" sz="2000" dirty="0">
+              <a:latin typeface="Times New Roman" pitchFamily="18" charset="0"/>
+              <a:cs typeface="Times New Roman" pitchFamily="18" charset="0"/>
+            </a:endParaRPr>
+          </a:p>
+          <a:p>
+            <a:r>
+              <a:rPr lang="zh-TW" altLang="en-US" sz="2000" dirty="0">
+                <a:latin typeface="Times New Roman" pitchFamily="18" charset="0"/>
+                <a:cs typeface="Times New Roman" pitchFamily="18" charset="0"/>
+              </a:rPr>
+              <a:t>    </a:t>
+            </a:r>
+            <a:r>
+              <a:rPr lang="en-US" altLang="zh-TW" sz="2000" dirty="0">
+                <a:solidFill>
+                  <a:srgbClr val="FF0000"/>
+                </a:solidFill>
+                <a:latin typeface="Times New Roman" pitchFamily="18" charset="0"/>
+                <a:cs typeface="Times New Roman" pitchFamily="18" charset="0"/>
+              </a:rPr>
+              <a:t>$.</a:t>
+            </a:r>
+            <a:r>
+              <a:rPr lang="en-US" altLang="zh-TW" sz="2000" dirty="0" err="1">
+                <a:solidFill>
+                  <a:srgbClr val="FF0000"/>
+                </a:solidFill>
+                <a:latin typeface="Times New Roman" pitchFamily="18" charset="0"/>
+                <a:cs typeface="Times New Roman" pitchFamily="18" charset="0"/>
+              </a:rPr>
+              <a:t>ajax</a:t>
+            </a:r>
+            <a:r>
+              <a:rPr lang="en-US" altLang="zh-TW" sz="2000" dirty="0">
+                <a:solidFill>
+                  <a:srgbClr val="FF0000"/>
+                </a:solidFill>
+                <a:latin typeface="Times New Roman" pitchFamily="18" charset="0"/>
+                <a:cs typeface="Times New Roman" pitchFamily="18" charset="0"/>
+              </a:rPr>
+              <a:t>(</a:t>
+            </a:r>
+            <a:r>
+              <a:rPr lang="en-US" altLang="zh-TW" sz="2000" dirty="0">
+                <a:solidFill>
+                  <a:srgbClr val="00B050"/>
+                </a:solidFill>
+                <a:latin typeface="Times New Roman" pitchFamily="18" charset="0"/>
+                <a:cs typeface="Times New Roman" pitchFamily="18" charset="0"/>
+              </a:rPr>
+              <a:t>"</a:t>
+            </a:r>
+            <a:r>
+              <a:rPr lang="en-US" altLang="zh-TW" sz="2000" dirty="0" err="1">
+                <a:solidFill>
+                  <a:srgbClr val="00B050"/>
+                </a:solidFill>
+                <a:latin typeface="Times New Roman" pitchFamily="18" charset="0"/>
+                <a:cs typeface="Times New Roman" pitchFamily="18" charset="0"/>
+              </a:rPr>
+              <a:t>url</a:t>
+            </a:r>
+            <a:r>
+              <a:rPr lang="en-US" altLang="zh-TW" sz="2000" dirty="0">
+                <a:solidFill>
+                  <a:srgbClr val="00B050"/>
+                </a:solidFill>
+                <a:latin typeface="Times New Roman" pitchFamily="18" charset="0"/>
+                <a:cs typeface="Times New Roman" pitchFamily="18" charset="0"/>
+              </a:rPr>
+              <a:t>"</a:t>
+            </a:r>
+            <a:r>
+              <a:rPr lang="en-US" altLang="zh-TW" sz="2000" dirty="0">
+                <a:solidFill>
+                  <a:srgbClr val="FF0000"/>
+                </a:solidFill>
+                <a:latin typeface="Times New Roman" pitchFamily="18" charset="0"/>
+                <a:cs typeface="Times New Roman" pitchFamily="18" charset="0"/>
+              </a:rPr>
+              <a:t>, </a:t>
+            </a:r>
+            <a:r>
+              <a:rPr lang="en-US" altLang="zh-TW" sz="2000" dirty="0" err="1" smtClean="0">
+                <a:solidFill>
+                  <a:srgbClr val="00B0F0"/>
+                </a:solidFill>
+                <a:latin typeface="Times New Roman" pitchFamily="18" charset="0"/>
+                <a:cs typeface="Times New Roman" pitchFamily="18" charset="0"/>
+              </a:rPr>
+              <a:t>SettingObject</a:t>
+            </a:r>
+            <a:r>
+              <a:rPr lang="en-US" altLang="zh-TW" sz="2000" dirty="0" smtClean="0">
+                <a:solidFill>
+                  <a:srgbClr val="FF0000"/>
+                </a:solidFill>
+                <a:latin typeface="Times New Roman" pitchFamily="18" charset="0"/>
+                <a:cs typeface="Times New Roman" pitchFamily="18" charset="0"/>
+              </a:rPr>
+              <a:t>);</a:t>
+            </a:r>
+          </a:p>
+          <a:p>
+            <a:endParaRPr lang="en-US" altLang="zh-TW" sz="2000" dirty="0">
+              <a:latin typeface="Times New Roman" pitchFamily="18" charset="0"/>
+              <a:cs typeface="Times New Roman" pitchFamily="18" charset="0"/>
+            </a:endParaRPr>
+          </a:p>
+          <a:p>
+            <a:r>
+              <a:rPr lang="en-US" altLang="zh-TW" sz="2000" dirty="0" err="1" smtClean="0">
+                <a:latin typeface="Times New Roman" pitchFamily="18" charset="0"/>
+                <a:cs typeface="Times New Roman" pitchFamily="18" charset="0"/>
+              </a:rPr>
+              <a:t>SettingObject</a:t>
+            </a:r>
+            <a:r>
+              <a:rPr lang="zh-TW" altLang="en-US" sz="2000" dirty="0" smtClean="0">
+                <a:latin typeface="Times New Roman" pitchFamily="18" charset="0"/>
+                <a:cs typeface="Times New Roman" pitchFamily="18" charset="0"/>
+              </a:rPr>
+              <a:t>：</a:t>
+            </a:r>
+            <a:endParaRPr lang="en-US" altLang="zh-TW" sz="2000" dirty="0">
+              <a:latin typeface="Times New Roman" pitchFamily="18" charset="0"/>
+              <a:cs typeface="Times New Roman" pitchFamily="18" charset="0"/>
+            </a:endParaRPr>
+          </a:p>
+          <a:p>
+            <a:r>
+              <a:rPr lang="en-US" altLang="zh-TW" sz="2000" dirty="0" smtClean="0">
+                <a:latin typeface="Times New Roman" pitchFamily="18" charset="0"/>
+                <a:cs typeface="Times New Roman" pitchFamily="18" charset="0"/>
+              </a:rPr>
+              <a:t>        method</a:t>
+            </a:r>
+            <a:r>
+              <a:rPr lang="zh-TW" altLang="en-US" sz="2000" dirty="0" smtClean="0">
+                <a:latin typeface="Times New Roman" pitchFamily="18" charset="0"/>
+                <a:cs typeface="Times New Roman" pitchFamily="18" charset="0"/>
+              </a:rPr>
+              <a:t>：常見的方式為 </a:t>
+            </a:r>
+            <a:r>
+              <a:rPr lang="en-US" altLang="zh-TW" sz="2000" dirty="0" smtClean="0">
+                <a:latin typeface="Times New Roman" pitchFamily="18" charset="0"/>
+                <a:cs typeface="Times New Roman" pitchFamily="18" charset="0"/>
+              </a:rPr>
+              <a:t>GET</a:t>
+            </a:r>
+            <a:r>
+              <a:rPr lang="zh-TW" altLang="en-US" sz="2000" dirty="0" smtClean="0">
+                <a:latin typeface="Times New Roman" pitchFamily="18" charset="0"/>
+                <a:cs typeface="Times New Roman" pitchFamily="18" charset="0"/>
+              </a:rPr>
+              <a:t> 或 </a:t>
+            </a:r>
+            <a:r>
+              <a:rPr lang="en-US" altLang="zh-TW" sz="2000" dirty="0" smtClean="0">
+                <a:latin typeface="Times New Roman" pitchFamily="18" charset="0"/>
+                <a:cs typeface="Times New Roman" pitchFamily="18" charset="0"/>
+              </a:rPr>
+              <a:t>POST</a:t>
+            </a:r>
+            <a:endParaRPr lang="en-US" altLang="zh-TW" sz="2000" dirty="0">
+              <a:latin typeface="Times New Roman" pitchFamily="18" charset="0"/>
+              <a:cs typeface="Times New Roman" pitchFamily="18" charset="0"/>
+            </a:endParaRPr>
+          </a:p>
+          <a:p>
+            <a:r>
+              <a:rPr lang="en-US" altLang="zh-TW" sz="2000" dirty="0">
+                <a:latin typeface="Times New Roman" pitchFamily="18" charset="0"/>
+                <a:cs typeface="Times New Roman" pitchFamily="18" charset="0"/>
+              </a:rPr>
+              <a:t>        </a:t>
+            </a:r>
+            <a:r>
+              <a:rPr lang="en-US" altLang="zh-TW" sz="2000" dirty="0" err="1" smtClean="0">
+                <a:latin typeface="Times New Roman" pitchFamily="18" charset="0"/>
+                <a:cs typeface="Times New Roman" pitchFamily="18" charset="0"/>
+              </a:rPr>
+              <a:t>async</a:t>
+            </a:r>
+            <a:r>
+              <a:rPr lang="zh-TW" altLang="en-US" sz="2000" dirty="0" smtClean="0">
+                <a:latin typeface="Times New Roman" pitchFamily="18" charset="0"/>
+                <a:cs typeface="Times New Roman" pitchFamily="18" charset="0"/>
+              </a:rPr>
+              <a:t>：是否為 </a:t>
+            </a:r>
+            <a:r>
+              <a:rPr lang="en-US" altLang="zh-TW" sz="2000" dirty="0" smtClean="0">
+                <a:latin typeface="Times New Roman" pitchFamily="18" charset="0"/>
+                <a:cs typeface="Times New Roman" pitchFamily="18" charset="0"/>
+              </a:rPr>
+              <a:t>asynchronous</a:t>
+            </a:r>
+            <a:endParaRPr lang="en-US" altLang="zh-TW" sz="2000" dirty="0">
+              <a:latin typeface="Times New Roman" pitchFamily="18" charset="0"/>
+              <a:cs typeface="Times New Roman" pitchFamily="18" charset="0"/>
+            </a:endParaRPr>
+          </a:p>
+          <a:p>
+            <a:r>
+              <a:rPr lang="en-US" altLang="zh-TW" sz="2000" dirty="0">
+                <a:latin typeface="Times New Roman" pitchFamily="18" charset="0"/>
+                <a:cs typeface="Times New Roman" pitchFamily="18" charset="0"/>
+              </a:rPr>
+              <a:t>        </a:t>
+            </a:r>
+            <a:r>
+              <a:rPr lang="en-US" altLang="zh-TW" sz="2000" dirty="0" err="1" smtClean="0">
+                <a:latin typeface="Times New Roman" pitchFamily="18" charset="0"/>
+                <a:cs typeface="Times New Roman" pitchFamily="18" charset="0"/>
+              </a:rPr>
+              <a:t>contentType</a:t>
+            </a:r>
+            <a:r>
+              <a:rPr lang="zh-TW" altLang="en-US" sz="2000" dirty="0" smtClean="0">
+                <a:latin typeface="Times New Roman" pitchFamily="18" charset="0"/>
+                <a:cs typeface="Times New Roman" pitchFamily="18" charset="0"/>
+              </a:rPr>
+              <a:t>： </a:t>
+            </a:r>
+            <a:r>
+              <a:rPr lang="zh-TW" altLang="en-US" sz="2000" dirty="0">
+                <a:latin typeface="Times New Roman" pitchFamily="18" charset="0"/>
+                <a:cs typeface="Times New Roman" pitchFamily="18" charset="0"/>
+              </a:rPr>
+              <a:t>傳</a:t>
+            </a:r>
+            <a:r>
+              <a:rPr lang="zh-TW" altLang="en-US" sz="2000" dirty="0" smtClean="0">
+                <a:latin typeface="Times New Roman" pitchFamily="18" charset="0"/>
+                <a:cs typeface="Times New Roman" pitchFamily="18" charset="0"/>
+              </a:rPr>
+              <a:t>給</a:t>
+            </a:r>
+            <a:r>
+              <a:rPr lang="zh-TW" altLang="en-US" sz="2000" dirty="0">
+                <a:latin typeface="Times New Roman" pitchFamily="18" charset="0"/>
+                <a:cs typeface="Times New Roman" pitchFamily="18" charset="0"/>
+              </a:rPr>
+              <a:t> </a:t>
+            </a:r>
+            <a:r>
+              <a:rPr lang="en-US" altLang="zh-TW" sz="2000" dirty="0" err="1" smtClean="0">
+                <a:latin typeface="Times New Roman" pitchFamily="18" charset="0"/>
+                <a:cs typeface="Times New Roman" pitchFamily="18" charset="0"/>
+              </a:rPr>
+              <a:t>api</a:t>
+            </a:r>
+            <a:r>
+              <a:rPr lang="en-US" altLang="zh-TW" sz="2000" dirty="0" smtClean="0">
+                <a:latin typeface="Times New Roman" pitchFamily="18" charset="0"/>
+                <a:cs typeface="Times New Roman" pitchFamily="18" charset="0"/>
+              </a:rPr>
+              <a:t> </a:t>
+            </a:r>
+            <a:r>
+              <a:rPr lang="zh-TW" altLang="en-US" sz="2000" dirty="0" smtClean="0">
+                <a:latin typeface="Times New Roman" pitchFamily="18" charset="0"/>
+                <a:cs typeface="Times New Roman" pitchFamily="18" charset="0"/>
+              </a:rPr>
+              <a:t>的資料型式</a:t>
+            </a:r>
+            <a:endParaRPr lang="en-US" altLang="zh-TW" sz="2000" dirty="0">
+              <a:latin typeface="Times New Roman" pitchFamily="18" charset="0"/>
+              <a:cs typeface="Times New Roman" pitchFamily="18" charset="0"/>
+            </a:endParaRPr>
+          </a:p>
+          <a:p>
+            <a:r>
+              <a:rPr lang="en-US" altLang="zh-TW" sz="2000" dirty="0">
+                <a:latin typeface="Times New Roman" pitchFamily="18" charset="0"/>
+                <a:cs typeface="Times New Roman" pitchFamily="18" charset="0"/>
+              </a:rPr>
+              <a:t>        </a:t>
+            </a:r>
+            <a:r>
+              <a:rPr lang="en-US" altLang="zh-TW" sz="2000" dirty="0" smtClean="0">
+                <a:latin typeface="Times New Roman" pitchFamily="18" charset="0"/>
+                <a:cs typeface="Times New Roman" pitchFamily="18" charset="0"/>
+              </a:rPr>
+              <a:t>data</a:t>
+            </a:r>
+            <a:r>
+              <a:rPr lang="zh-TW" altLang="en-US" sz="2000" dirty="0" smtClean="0">
+                <a:latin typeface="Times New Roman" pitchFamily="18" charset="0"/>
+                <a:cs typeface="Times New Roman" pitchFamily="18" charset="0"/>
+              </a:rPr>
+              <a:t>：</a:t>
+            </a:r>
+            <a:r>
+              <a:rPr lang="zh-TW" altLang="en-US" sz="2000" dirty="0">
+                <a:latin typeface="Times New Roman" pitchFamily="18" charset="0"/>
+                <a:cs typeface="Times New Roman" pitchFamily="18" charset="0"/>
+              </a:rPr>
+              <a:t>傳給 </a:t>
+            </a:r>
+            <a:r>
+              <a:rPr lang="en-US" altLang="zh-TW" sz="2000" dirty="0" err="1">
+                <a:latin typeface="Times New Roman" pitchFamily="18" charset="0"/>
+                <a:cs typeface="Times New Roman" pitchFamily="18" charset="0"/>
+              </a:rPr>
+              <a:t>api</a:t>
+            </a:r>
+            <a:r>
+              <a:rPr lang="en-US" altLang="zh-TW" sz="2000" dirty="0">
+                <a:latin typeface="Times New Roman" pitchFamily="18" charset="0"/>
+                <a:cs typeface="Times New Roman" pitchFamily="18" charset="0"/>
+              </a:rPr>
+              <a:t> </a:t>
+            </a:r>
+            <a:r>
+              <a:rPr lang="zh-TW" altLang="en-US" sz="2000" dirty="0">
+                <a:latin typeface="Times New Roman" pitchFamily="18" charset="0"/>
+                <a:cs typeface="Times New Roman" pitchFamily="18" charset="0"/>
+              </a:rPr>
+              <a:t>的</a:t>
+            </a:r>
+            <a:r>
+              <a:rPr lang="zh-TW" altLang="en-US" sz="2000" dirty="0" smtClean="0">
+                <a:latin typeface="Times New Roman" pitchFamily="18" charset="0"/>
+                <a:cs typeface="Times New Roman" pitchFamily="18" charset="0"/>
+              </a:rPr>
+              <a:t>資料內容</a:t>
+            </a:r>
+            <a:endParaRPr lang="en-US" altLang="zh-TW" sz="2000" dirty="0" smtClean="0">
+              <a:latin typeface="Times New Roman" pitchFamily="18" charset="0"/>
+              <a:cs typeface="Times New Roman" pitchFamily="18" charset="0"/>
+            </a:endParaRPr>
+          </a:p>
+          <a:p>
+            <a:endParaRPr lang="en-US" altLang="zh-TW" sz="2000" dirty="0">
+              <a:latin typeface="Times New Roman" pitchFamily="18" charset="0"/>
+              <a:cs typeface="Times New Roman" pitchFamily="18" charset="0"/>
+            </a:endParaRPr>
+          </a:p>
+          <a:p>
+            <a:r>
+              <a:rPr lang="en-US" altLang="zh-TW" sz="2000" dirty="0" smtClean="0">
+                <a:latin typeface="Times New Roman" pitchFamily="18" charset="0"/>
+                <a:cs typeface="Times New Roman" pitchFamily="18" charset="0"/>
+              </a:rPr>
+              <a:t>$.</a:t>
+            </a:r>
+            <a:r>
+              <a:rPr lang="en-US" altLang="zh-TW" sz="2000" dirty="0" err="1" smtClean="0">
+                <a:latin typeface="Times New Roman" pitchFamily="18" charset="0"/>
+                <a:cs typeface="Times New Roman" pitchFamily="18" charset="0"/>
+              </a:rPr>
+              <a:t>ajax</a:t>
+            </a:r>
+            <a:r>
+              <a:rPr lang="en-US" altLang="zh-TW" sz="2000" dirty="0" smtClean="0">
+                <a:latin typeface="Times New Roman" pitchFamily="18" charset="0"/>
+                <a:cs typeface="Times New Roman" pitchFamily="18" charset="0"/>
+              </a:rPr>
+              <a:t>() </a:t>
+            </a:r>
+            <a:r>
+              <a:rPr lang="zh-TW" altLang="en-US" sz="2000" dirty="0" smtClean="0">
+                <a:latin typeface="Times New Roman" pitchFamily="18" charset="0"/>
+                <a:cs typeface="Times New Roman" pitchFamily="18" charset="0"/>
+              </a:rPr>
+              <a:t>後面通常會串接 </a:t>
+            </a:r>
+            <a:r>
+              <a:rPr lang="en-US" altLang="zh-TW" sz="2000" dirty="0" smtClean="0">
+                <a:latin typeface="Times New Roman" pitchFamily="18" charset="0"/>
+                <a:cs typeface="Times New Roman" pitchFamily="18" charset="0"/>
+              </a:rPr>
+              <a:t>.done()</a:t>
+            </a:r>
+            <a:r>
+              <a:rPr lang="zh-TW" altLang="en-US" sz="2000" dirty="0" smtClean="0">
+                <a:latin typeface="Times New Roman" pitchFamily="18" charset="0"/>
+                <a:cs typeface="Times New Roman" pitchFamily="18" charset="0"/>
+              </a:rPr>
+              <a:t>、</a:t>
+            </a:r>
+            <a:r>
+              <a:rPr lang="en-US" altLang="zh-TW" sz="2000" dirty="0" smtClean="0">
+                <a:latin typeface="Times New Roman" pitchFamily="18" charset="0"/>
+                <a:cs typeface="Times New Roman" pitchFamily="18" charset="0"/>
+              </a:rPr>
+              <a:t>,fail()</a:t>
+            </a:r>
+            <a:r>
+              <a:rPr lang="zh-TW" altLang="en-US" sz="2000" dirty="0" smtClean="0">
+                <a:latin typeface="Times New Roman" pitchFamily="18" charset="0"/>
+                <a:cs typeface="Times New Roman" pitchFamily="18" charset="0"/>
+              </a:rPr>
+              <a:t>、</a:t>
+            </a:r>
+            <a:r>
+              <a:rPr lang="en-US" altLang="zh-TW" sz="2000" dirty="0" smtClean="0">
+                <a:latin typeface="Times New Roman" pitchFamily="18" charset="0"/>
+                <a:cs typeface="Times New Roman" pitchFamily="18" charset="0"/>
+              </a:rPr>
+              <a:t>.then()</a:t>
+            </a:r>
+            <a:r>
+              <a:rPr lang="zh-TW" altLang="en-US" sz="2000" dirty="0">
+                <a:latin typeface="Times New Roman" pitchFamily="18" charset="0"/>
+                <a:cs typeface="Times New Roman" pitchFamily="18" charset="0"/>
+              </a:rPr>
+              <a:t> </a:t>
+            </a:r>
+            <a:r>
+              <a:rPr lang="zh-TW" altLang="en-US" sz="2000" dirty="0" smtClean="0">
+                <a:latin typeface="Times New Roman" pitchFamily="18" charset="0"/>
+                <a:cs typeface="Times New Roman" pitchFamily="18" charset="0"/>
+              </a:rPr>
+              <a:t>等來處理回傳的資料</a:t>
+            </a:r>
+            <a:endParaRPr lang="en-US" altLang="zh-TW" sz="2000" dirty="0" smtClean="0">
+              <a:latin typeface="Times New Roman" pitchFamily="18" charset="0"/>
+              <a:cs typeface="Times New Roman" pitchFamily="18" charset="0"/>
+            </a:endParaRPr>
+          </a:p>
+          <a:p>
+            <a:endParaRPr lang="en-US" altLang="zh-TW" sz="2000" dirty="0">
+              <a:latin typeface="Times New Roman" pitchFamily="18" charset="0"/>
+              <a:cs typeface="Times New Roman" pitchFamily="18" charset="0"/>
+            </a:endParaRPr>
+          </a:p>
+          <a:p>
+            <a:endParaRPr lang="en-US" altLang="zh-TW" sz="2000" dirty="0" smtClean="0">
+              <a:latin typeface="Times New Roman" pitchFamily="18" charset="0"/>
+              <a:cs typeface="Times New Roman" pitchFamily="18" charset="0"/>
+            </a:endParaRPr>
+          </a:p>
+          <a:p>
+            <a:r>
+              <a:rPr lang="en-US" altLang="zh-TW" sz="2000" dirty="0" smtClean="0">
+                <a:latin typeface="Times New Roman" pitchFamily="18" charset="0"/>
+                <a:cs typeface="Times New Roman" pitchFamily="18" charset="0"/>
+              </a:rPr>
+              <a:t>※GET </a:t>
+            </a:r>
+            <a:r>
+              <a:rPr lang="zh-TW" altLang="en-US" sz="2000" dirty="0">
+                <a:latin typeface="Times New Roman" pitchFamily="18" charset="0"/>
+                <a:cs typeface="Times New Roman" pitchFamily="18" charset="0"/>
+              </a:rPr>
+              <a:t>明碼傳輸會有安全</a:t>
+            </a:r>
+            <a:r>
+              <a:rPr lang="zh-TW" altLang="en-US" sz="2000" dirty="0" smtClean="0">
+                <a:latin typeface="Times New Roman" pitchFamily="18" charset="0"/>
+                <a:cs typeface="Times New Roman" pitchFamily="18" charset="0"/>
+              </a:rPr>
+              <a:t>問題</a:t>
+            </a:r>
+            <a:r>
+              <a:rPr lang="zh-TW" altLang="en-US" sz="2000" smtClean="0">
+                <a:latin typeface="Times New Roman" pitchFamily="18" charset="0"/>
+                <a:cs typeface="Times New Roman" pitchFamily="18" charset="0"/>
+              </a:rPr>
+              <a:t>，所以會改用 </a:t>
+            </a:r>
+            <a:r>
+              <a:rPr lang="en-US" altLang="zh-TW" sz="2000" dirty="0" smtClean="0">
+                <a:latin typeface="Times New Roman" pitchFamily="18" charset="0"/>
+                <a:cs typeface="Times New Roman" pitchFamily="18" charset="0"/>
+              </a:rPr>
+              <a:t>POST</a:t>
+            </a:r>
+            <a:r>
+              <a:rPr lang="zh-TW" altLang="en-US" sz="2000" dirty="0" smtClean="0">
+                <a:latin typeface="Times New Roman" pitchFamily="18" charset="0"/>
+                <a:cs typeface="Times New Roman" pitchFamily="18" charset="0"/>
+              </a:rPr>
+              <a:t> 避免這個問題</a:t>
+            </a:r>
+            <a:endParaRPr lang="en-US" altLang="zh-TW" sz="2000" dirty="0">
+              <a:latin typeface="Times New Roman" pitchFamily="18" charset="0"/>
+              <a:cs typeface="Times New Roman" pitchFamily="18" charset="0"/>
+            </a:endParaRPr>
+          </a:p>
+        </p:txBody>
+      </p:sp>
+    </p:spTree>
+    <p:extLst>
+      <p:ext uri="{BB962C8B-B14F-4D97-AF65-F5344CB8AC3E}">
+        <p14:creationId xmlns:p14="http://schemas.microsoft.com/office/powerpoint/2010/main" val="2744708792"/>
       </p:ext>
     </p:extLst>
   </p:cSld>

</xml_diff>